<commit_message>
functional requirements, architectural design, design decision and patterns
</commit_message>
<xml_diff>
--- a/Schemi Design App/Presentazione standard1.pptx
+++ b/Schemi Design App/Presentazione standard1.pptx
@@ -6,6 +6,8 @@
   </p:sldMasterIdLst>
   <p:sldIdLst>
     <p:sldId id="256" r:id="rId2"/>
+    <p:sldId id="257" r:id="rId3"/>
+    <p:sldId id="258" r:id="rId4"/>
   </p:sldIdLst>
   <p:sldSz cx="12192000" cy="6858000"/>
   <p:notesSz cx="6858000" cy="9144000"/>
@@ -104,6 +106,11 @@
       </a:defRPr>
     </a:lvl9pPr>
   </p:defaultTextStyle>
+  <p:extLst>
+    <p:ext uri="{EFAFB233-063F-42B5-8137-9DF3F51BA10A}">
+      <p15:sldGuideLst xmlns:p15="http://schemas.microsoft.com/office/powerpoint/2012/main"/>
+    </p:ext>
+  </p:extLst>
 </p:presentation>
 </file>
 
@@ -256,7 +263,7 @@
           <a:p>
             <a:fld id="{276A63D4-4CEE-4156-BDE0-E850523B811A}" type="datetimeFigureOut">
               <a:rPr lang="en-US" smtClean="0"/>
-              <a:t>1/19/2021</a:t>
+              <a:t>1/20/2021</a:t>
             </a:fld>
             <a:endParaRPr lang="en-US"/>
           </a:p>
@@ -456,7 +463,7 @@
           <a:p>
             <a:fld id="{276A63D4-4CEE-4156-BDE0-E850523B811A}" type="datetimeFigureOut">
               <a:rPr lang="en-US" smtClean="0"/>
-              <a:t>1/19/2021</a:t>
+              <a:t>1/20/2021</a:t>
             </a:fld>
             <a:endParaRPr lang="en-US"/>
           </a:p>
@@ -666,7 +673,7 @@
           <a:p>
             <a:fld id="{276A63D4-4CEE-4156-BDE0-E850523B811A}" type="datetimeFigureOut">
               <a:rPr lang="en-US" smtClean="0"/>
-              <a:t>1/19/2021</a:t>
+              <a:t>1/20/2021</a:t>
             </a:fld>
             <a:endParaRPr lang="en-US"/>
           </a:p>
@@ -866,7 +873,7 @@
           <a:p>
             <a:fld id="{276A63D4-4CEE-4156-BDE0-E850523B811A}" type="datetimeFigureOut">
               <a:rPr lang="en-US" smtClean="0"/>
-              <a:t>1/19/2021</a:t>
+              <a:t>1/20/2021</a:t>
             </a:fld>
             <a:endParaRPr lang="en-US"/>
           </a:p>
@@ -1142,7 +1149,7 @@
           <a:p>
             <a:fld id="{276A63D4-4CEE-4156-BDE0-E850523B811A}" type="datetimeFigureOut">
               <a:rPr lang="en-US" smtClean="0"/>
-              <a:t>1/19/2021</a:t>
+              <a:t>1/20/2021</a:t>
             </a:fld>
             <a:endParaRPr lang="en-US"/>
           </a:p>
@@ -1410,7 +1417,7 @@
           <a:p>
             <a:fld id="{276A63D4-4CEE-4156-BDE0-E850523B811A}" type="datetimeFigureOut">
               <a:rPr lang="en-US" smtClean="0"/>
-              <a:t>1/19/2021</a:t>
+              <a:t>1/20/2021</a:t>
             </a:fld>
             <a:endParaRPr lang="en-US"/>
           </a:p>
@@ -1825,7 +1832,7 @@
           <a:p>
             <a:fld id="{276A63D4-4CEE-4156-BDE0-E850523B811A}" type="datetimeFigureOut">
               <a:rPr lang="en-US" smtClean="0"/>
-              <a:t>1/19/2021</a:t>
+              <a:t>1/20/2021</a:t>
             </a:fld>
             <a:endParaRPr lang="en-US"/>
           </a:p>
@@ -1967,7 +1974,7 @@
           <a:p>
             <a:fld id="{276A63D4-4CEE-4156-BDE0-E850523B811A}" type="datetimeFigureOut">
               <a:rPr lang="en-US" smtClean="0"/>
-              <a:t>1/19/2021</a:t>
+              <a:t>1/20/2021</a:t>
             </a:fld>
             <a:endParaRPr lang="en-US"/>
           </a:p>
@@ -2080,7 +2087,7 @@
           <a:p>
             <a:fld id="{276A63D4-4CEE-4156-BDE0-E850523B811A}" type="datetimeFigureOut">
               <a:rPr lang="en-US" smtClean="0"/>
-              <a:t>1/19/2021</a:t>
+              <a:t>1/20/2021</a:t>
             </a:fld>
             <a:endParaRPr lang="en-US"/>
           </a:p>
@@ -2393,7 +2400,7 @@
           <a:p>
             <a:fld id="{276A63D4-4CEE-4156-BDE0-E850523B811A}" type="datetimeFigureOut">
               <a:rPr lang="en-US" smtClean="0"/>
-              <a:t>1/19/2021</a:t>
+              <a:t>1/20/2021</a:t>
             </a:fld>
             <a:endParaRPr lang="en-US"/>
           </a:p>
@@ -2682,7 +2689,7 @@
           <a:p>
             <a:fld id="{276A63D4-4CEE-4156-BDE0-E850523B811A}" type="datetimeFigureOut">
               <a:rPr lang="en-US" smtClean="0"/>
-              <a:t>1/19/2021</a:t>
+              <a:t>1/20/2021</a:t>
             </a:fld>
             <a:endParaRPr lang="en-US"/>
           </a:p>
@@ -2925,7 +2932,7 @@
           <a:p>
             <a:fld id="{276A63D4-4CEE-4156-BDE0-E850523B811A}" type="datetimeFigureOut">
               <a:rPr lang="en-US" smtClean="0"/>
-              <a:t>1/19/2021</a:t>
+              <a:t>1/20/2021</a:t>
             </a:fld>
             <a:endParaRPr lang="en-US"/>
           </a:p>
@@ -3975,12 +3982,42 @@
           </a:p>
         </p:txBody>
       </p:sp>
-      <p:sp>
-        <p:nvSpPr>
-          <p:cNvPr id="40" name="CasellaDiTesto 39">
-            <a:extLst>
-              <a:ext uri="{FF2B5EF4-FFF2-40B4-BE49-F238E27FC236}">
-                <a16:creationId xmlns:a16="http://schemas.microsoft.com/office/drawing/2014/main" id="{98F2B249-1044-4B7A-9161-FD4E2BAAEAEC}"/>
+    </p:spTree>
+    <p:extLst>
+      <p:ext uri="{BB962C8B-B14F-4D97-AF65-F5344CB8AC3E}">
+        <p14:creationId xmlns:p14="http://schemas.microsoft.com/office/powerpoint/2010/main" val="3000997908"/>
+      </p:ext>
+    </p:extLst>
+  </p:cSld>
+  <p:clrMapOvr>
+    <a:masterClrMapping/>
+  </p:clrMapOvr>
+</p:sld>
+</file>
+
+<file path=ppt/slides/slide2.xml><?xml version="1.0" encoding="utf-8"?>
+<p:sld xmlns:a="http://schemas.openxmlformats.org/drawingml/2006/main" xmlns:r="http://schemas.openxmlformats.org/officeDocument/2006/relationships" xmlns:p="http://schemas.openxmlformats.org/presentationml/2006/main">
+  <p:cSld>
+    <p:spTree>
+      <p:nvGrpSpPr>
+        <p:cNvPr id="1" name=""/>
+        <p:cNvGrpSpPr/>
+        <p:nvPr/>
+      </p:nvGrpSpPr>
+      <p:grpSpPr>
+        <a:xfrm>
+          <a:off x="0" y="0"/>
+          <a:ext cx="0" cy="0"/>
+          <a:chOff x="0" y="0"/>
+          <a:chExt cx="0" cy="0"/>
+        </a:xfrm>
+      </p:grpSpPr>
+      <p:sp>
+        <p:nvSpPr>
+          <p:cNvPr id="4" name="CasellaDiTesto 3">
+            <a:extLst>
+              <a:ext uri="{FF2B5EF4-FFF2-40B4-BE49-F238E27FC236}">
+                <a16:creationId xmlns:a16="http://schemas.microsoft.com/office/drawing/2014/main" id="{44CA7988-30F3-4ACE-A2BD-AC7F8390E194}"/>
               </a:ext>
             </a:extLst>
           </p:cNvPr>
@@ -4114,7 +4151,151 @@
     </p:spTree>
     <p:extLst>
       <p:ext uri="{BB962C8B-B14F-4D97-AF65-F5344CB8AC3E}">
-        <p14:creationId xmlns:p14="http://schemas.microsoft.com/office/powerpoint/2010/main" val="3000997908"/>
+        <p14:creationId xmlns:p14="http://schemas.microsoft.com/office/powerpoint/2010/main" val="2544288255"/>
+      </p:ext>
+    </p:extLst>
+  </p:cSld>
+  <p:clrMapOvr>
+    <a:masterClrMapping/>
+  </p:clrMapOvr>
+</p:sld>
+</file>
+
+<file path=ppt/slides/slide3.xml><?xml version="1.0" encoding="utf-8"?>
+<p:sld xmlns:a="http://schemas.openxmlformats.org/drawingml/2006/main" xmlns:r="http://schemas.openxmlformats.org/officeDocument/2006/relationships" xmlns:p="http://schemas.openxmlformats.org/presentationml/2006/main">
+  <p:cSld>
+    <p:spTree>
+      <p:nvGrpSpPr>
+        <p:cNvPr id="1" name=""/>
+        <p:cNvGrpSpPr/>
+        <p:nvPr/>
+      </p:nvGrpSpPr>
+      <p:grpSpPr>
+        <a:xfrm>
+          <a:off x="0" y="0"/>
+          <a:ext cx="0" cy="0"/>
+          <a:chOff x="0" y="0"/>
+          <a:chExt cx="0" cy="0"/>
+        </a:xfrm>
+      </p:grpSpPr>
+      <p:sp>
+        <p:nvSpPr>
+          <p:cNvPr id="3" name="Segnaposto contenuto 2">
+            <a:extLst>
+              <a:ext uri="{FF2B5EF4-FFF2-40B4-BE49-F238E27FC236}">
+                <a16:creationId xmlns:a16="http://schemas.microsoft.com/office/drawing/2014/main" id="{A7F4B4C6-DD7C-4956-9BC7-694EA95EBF03}"/>
+              </a:ext>
+            </a:extLst>
+          </p:cNvPr>
+          <p:cNvSpPr>
+            <a:spLocks noGrp="1"/>
+          </p:cNvSpPr>
+          <p:nvPr>
+            <p:ph idx="1"/>
+          </p:nvPr>
+        </p:nvSpPr>
+        <p:spPr>
+          <a:xfrm>
+            <a:off x="953610" y="715916"/>
+            <a:ext cx="7006146" cy="4351338"/>
+          </a:xfrm>
+        </p:spPr>
+        <p:txBody>
+          <a:bodyPr/>
+          <a:lstStyle/>
+          <a:p>
+            <a:r>
+              <a:rPr lang="it-IT" dirty="0"/>
+              <a:t>Perché abbiamo deciso di rendere l’app 2 </a:t>
+            </a:r>
+            <a:r>
+              <a:rPr lang="it-IT" dirty="0" err="1"/>
+              <a:t>two</a:t>
+            </a:r>
+            <a:r>
+              <a:rPr lang="it-IT" dirty="0"/>
+              <a:t> </a:t>
+            </a:r>
+            <a:r>
+              <a:rPr lang="it-IT" dirty="0" err="1"/>
+              <a:t>tiers</a:t>
+            </a:r>
+            <a:endParaRPr lang="it-IT" dirty="0"/>
+          </a:p>
+          <a:p>
+            <a:r>
+              <a:rPr lang="it-IT" dirty="0"/>
+              <a:t>Perché </a:t>
+            </a:r>
+            <a:r>
+              <a:rPr lang="it-IT" dirty="0" err="1"/>
+              <a:t>firebase</a:t>
+            </a:r>
+            <a:r>
+              <a:rPr lang="it-IT" dirty="0"/>
+              <a:t> come provider di autenticazione</a:t>
+            </a:r>
+          </a:p>
+          <a:p>
+            <a:r>
+              <a:rPr lang="it-IT" dirty="0"/>
+              <a:t>Perché </a:t>
+            </a:r>
+            <a:r>
+              <a:rPr lang="it-IT" dirty="0" err="1"/>
+              <a:t>firebase</a:t>
+            </a:r>
+            <a:r>
+              <a:rPr lang="it-IT" dirty="0"/>
+              <a:t> come store di dati</a:t>
+            </a:r>
+          </a:p>
+          <a:p>
+            <a:r>
+              <a:rPr lang="it-IT" dirty="0"/>
+              <a:t>Perché </a:t>
+            </a:r>
+            <a:r>
+              <a:rPr lang="it-IT" dirty="0" err="1"/>
+              <a:t>mobx</a:t>
+            </a:r>
+            <a:r>
+              <a:rPr lang="it-IT" dirty="0"/>
+              <a:t> library come  Design patterns</a:t>
+            </a:r>
+          </a:p>
+          <a:p>
+            <a:pPr marL="0" indent="0">
+              <a:buNone/>
+            </a:pPr>
+            <a:endParaRPr lang="it-IT" dirty="0"/>
+          </a:p>
+          <a:p>
+            <a:r>
+              <a:rPr lang="it-IT" dirty="0"/>
+              <a:t>Perché Open food </a:t>
+            </a:r>
+            <a:r>
+              <a:rPr lang="it-IT" dirty="0" err="1"/>
+              <a:t>facts</a:t>
+            </a:r>
+            <a:r>
+              <a:rPr lang="it-IT" dirty="0"/>
+              <a:t> </a:t>
+            </a:r>
+          </a:p>
+          <a:p>
+            <a:r>
+              <a:rPr lang="it-IT" dirty="0"/>
+              <a:t>Perché flutter </a:t>
+            </a:r>
+          </a:p>
+        </p:txBody>
+      </p:sp>
+    </p:spTree>
+    <p:extLst>
+      <p:ext uri="{BB962C8B-B14F-4D97-AF65-F5344CB8AC3E}">
+        <p14:creationId xmlns:p14="http://schemas.microsoft.com/office/powerpoint/2010/main" val="4040013542"/>
       </p:ext>
     </p:extLst>
   </p:cSld>

</xml_diff>